<commit_message>
Add recycler view to show query results
</commit_message>
<xml_diff>
--- a/app logos.pptx
+++ b/app logos.pptx
@@ -8,6 +8,8 @@
     <p:sldId id="256" r:id="rId2"/>
     <p:sldId id="258" r:id="rId3"/>
     <p:sldId id="259" r:id="rId4"/>
+    <p:sldId id="260" r:id="rId5"/>
+    <p:sldId id="261" r:id="rId6"/>
   </p:sldIdLst>
   <p:sldSz cx="12192000" cy="6858000"/>
   <p:notesSz cx="6858000" cy="9144000"/>
@@ -261,7 +263,7 @@
           <a:p>
             <a:fld id="{01060C3E-6DCD-44D1-86FE-A17BB40FDE6F}" type="datetimeFigureOut">
               <a:rPr lang="en-US" smtClean="0"/>
-              <a:t>2019-06-16</a:t>
+              <a:t>2019-06-20</a:t>
             </a:fld>
             <a:endParaRPr lang="en-US"/>
           </a:p>
@@ -459,7 +461,7 @@
           <a:p>
             <a:fld id="{01060C3E-6DCD-44D1-86FE-A17BB40FDE6F}" type="datetimeFigureOut">
               <a:rPr lang="en-US" smtClean="0"/>
-              <a:t>2019-06-16</a:t>
+              <a:t>2019-06-20</a:t>
             </a:fld>
             <a:endParaRPr lang="en-US"/>
           </a:p>
@@ -667,7 +669,7 @@
           <a:p>
             <a:fld id="{01060C3E-6DCD-44D1-86FE-A17BB40FDE6F}" type="datetimeFigureOut">
               <a:rPr lang="en-US" smtClean="0"/>
-              <a:t>2019-06-16</a:t>
+              <a:t>2019-06-20</a:t>
             </a:fld>
             <a:endParaRPr lang="en-US"/>
           </a:p>
@@ -865,7 +867,7 @@
           <a:p>
             <a:fld id="{01060C3E-6DCD-44D1-86FE-A17BB40FDE6F}" type="datetimeFigureOut">
               <a:rPr lang="en-US" smtClean="0"/>
-              <a:t>2019-06-16</a:t>
+              <a:t>2019-06-20</a:t>
             </a:fld>
             <a:endParaRPr lang="en-US"/>
           </a:p>
@@ -1140,7 +1142,7 @@
           <a:p>
             <a:fld id="{01060C3E-6DCD-44D1-86FE-A17BB40FDE6F}" type="datetimeFigureOut">
               <a:rPr lang="en-US" smtClean="0"/>
-              <a:t>2019-06-16</a:t>
+              <a:t>2019-06-20</a:t>
             </a:fld>
             <a:endParaRPr lang="en-US"/>
           </a:p>
@@ -1405,7 +1407,7 @@
           <a:p>
             <a:fld id="{01060C3E-6DCD-44D1-86FE-A17BB40FDE6F}" type="datetimeFigureOut">
               <a:rPr lang="en-US" smtClean="0"/>
-              <a:t>2019-06-16</a:t>
+              <a:t>2019-06-20</a:t>
             </a:fld>
             <a:endParaRPr lang="en-US"/>
           </a:p>
@@ -1817,7 +1819,7 @@
           <a:p>
             <a:fld id="{01060C3E-6DCD-44D1-86FE-A17BB40FDE6F}" type="datetimeFigureOut">
               <a:rPr lang="en-US" smtClean="0"/>
-              <a:t>2019-06-16</a:t>
+              <a:t>2019-06-20</a:t>
             </a:fld>
             <a:endParaRPr lang="en-US"/>
           </a:p>
@@ -1958,7 +1960,7 @@
           <a:p>
             <a:fld id="{01060C3E-6DCD-44D1-86FE-A17BB40FDE6F}" type="datetimeFigureOut">
               <a:rPr lang="en-US" smtClean="0"/>
-              <a:t>2019-06-16</a:t>
+              <a:t>2019-06-20</a:t>
             </a:fld>
             <a:endParaRPr lang="en-US"/>
           </a:p>
@@ -2071,7 +2073,7 @@
           <a:p>
             <a:fld id="{01060C3E-6DCD-44D1-86FE-A17BB40FDE6F}" type="datetimeFigureOut">
               <a:rPr lang="en-US" smtClean="0"/>
-              <a:t>2019-06-16</a:t>
+              <a:t>2019-06-20</a:t>
             </a:fld>
             <a:endParaRPr lang="en-US"/>
           </a:p>
@@ -2382,7 +2384,7 @@
           <a:p>
             <a:fld id="{01060C3E-6DCD-44D1-86FE-A17BB40FDE6F}" type="datetimeFigureOut">
               <a:rPr lang="en-US" smtClean="0"/>
-              <a:t>2019-06-16</a:t>
+              <a:t>2019-06-20</a:t>
             </a:fld>
             <a:endParaRPr lang="en-US"/>
           </a:p>
@@ -2670,7 +2672,7 @@
           <a:p>
             <a:fld id="{01060C3E-6DCD-44D1-86FE-A17BB40FDE6F}" type="datetimeFigureOut">
               <a:rPr lang="en-US" smtClean="0"/>
-              <a:t>2019-06-16</a:t>
+              <a:t>2019-06-20</a:t>
             </a:fld>
             <a:endParaRPr lang="en-US"/>
           </a:p>
@@ -2911,7 +2913,7 @@
           <a:p>
             <a:fld id="{01060C3E-6DCD-44D1-86FE-A17BB40FDE6F}" type="datetimeFigureOut">
               <a:rPr lang="en-US" smtClean="0"/>
-              <a:t>2019-06-16</a:t>
+              <a:t>2019-06-20</a:t>
             </a:fld>
             <a:endParaRPr lang="en-US"/>
           </a:p>
@@ -4800,6 +4802,673 @@
 </p:sld>
 </file>
 
+<file path=ppt/slides/slide4.xml><?xml version="1.0" encoding="utf-8"?>
+<p:sld xmlns:a="http://schemas.openxmlformats.org/drawingml/2006/main" xmlns:r="http://schemas.openxmlformats.org/officeDocument/2006/relationships" xmlns:p="http://schemas.openxmlformats.org/presentationml/2006/main">
+  <p:cSld>
+    <p:spTree>
+      <p:nvGrpSpPr>
+        <p:cNvPr id="1" name=""/>
+        <p:cNvGrpSpPr/>
+        <p:nvPr/>
+      </p:nvGrpSpPr>
+      <p:grpSpPr>
+        <a:xfrm>
+          <a:off x="0" y="0"/>
+          <a:ext cx="0" cy="0"/>
+          <a:chOff x="0" y="0"/>
+          <a:chExt cx="0" cy="0"/>
+        </a:xfrm>
+      </p:grpSpPr>
+      <p:sp>
+        <p:nvSpPr>
+          <p:cNvPr id="4" name="AutoShape 2" descr="Image result for refresh button">
+            <a:extLst>
+              <a:ext uri="{FF2B5EF4-FFF2-40B4-BE49-F238E27FC236}">
+                <a16:creationId xmlns:a16="http://schemas.microsoft.com/office/drawing/2014/main" id="{6759A204-04BE-4DB8-8201-DEDA145F421A}"/>
+              </a:ext>
+            </a:extLst>
+          </p:cNvPr>
+          <p:cNvSpPr>
+            <a:spLocks noChangeAspect="1" noChangeArrowheads="1"/>
+          </p:cNvSpPr>
+          <p:nvPr/>
+        </p:nvSpPr>
+        <p:spPr bwMode="auto">
+          <a:xfrm>
+            <a:off x="4652963" y="1928813"/>
+            <a:ext cx="2886075" cy="3000375"/>
+          </a:xfrm>
+          <a:prstGeom prst="rect">
+            <a:avLst/>
+          </a:prstGeom>
+          <a:noFill/>
+          <a:extLst>
+            <a:ext uri="{909E8E84-426E-40DD-AFC4-6F175D3DCCD1}">
+              <a14:hiddenFill xmlns:a14="http://schemas.microsoft.com/office/drawing/2010/main">
+                <a:solidFill>
+                  <a:srgbClr val="FFFFFF"/>
+                </a:solidFill>
+              </a14:hiddenFill>
+            </a:ext>
+          </a:extLst>
+        </p:spPr>
+        <p:txBody>
+          <a:bodyPr vert="horz" wrap="square" lIns="91440" tIns="45720" rIns="91440" bIns="45720" numCol="1" anchor="t" anchorCtr="0" compatLnSpc="1">
+            <a:prstTxWarp prst="textNoShape">
+              <a:avLst/>
+            </a:prstTxWarp>
+          </a:bodyPr>
+          <a:lstStyle/>
+          <a:p>
+            <a:endParaRPr lang="en-US"/>
+          </a:p>
+        </p:txBody>
+      </p:sp>
+      <p:pic>
+        <p:nvPicPr>
+          <p:cNvPr id="5" name="Picture 4">
+            <a:extLst>
+              <a:ext uri="{FF2B5EF4-FFF2-40B4-BE49-F238E27FC236}">
+                <a16:creationId xmlns:a16="http://schemas.microsoft.com/office/drawing/2014/main" id="{9089E8BC-5719-4E99-8493-52BA3D989DA6}"/>
+              </a:ext>
+            </a:extLst>
+          </p:cNvPr>
+          <p:cNvPicPr>
+            <a:picLocks noChangeAspect="1"/>
+          </p:cNvPicPr>
+          <p:nvPr/>
+        </p:nvPicPr>
+        <p:blipFill>
+          <a:blip r:embed="rId2"/>
+          <a:stretch>
+            <a:fillRect/>
+          </a:stretch>
+        </p:blipFill>
+        <p:spPr>
+          <a:xfrm>
+            <a:off x="1693047" y="1668753"/>
+            <a:ext cx="2886075" cy="3000375"/>
+          </a:xfrm>
+          <a:prstGeom prst="rect">
+            <a:avLst/>
+          </a:prstGeom>
+        </p:spPr>
+      </p:pic>
+      <p:grpSp>
+        <p:nvGrpSpPr>
+          <p:cNvPr id="13" name="Group 12">
+            <a:extLst>
+              <a:ext uri="{FF2B5EF4-FFF2-40B4-BE49-F238E27FC236}">
+                <a16:creationId xmlns:a16="http://schemas.microsoft.com/office/drawing/2014/main" id="{67DDCD85-9A77-4305-BA15-E50F8F439081}"/>
+              </a:ext>
+            </a:extLst>
+          </p:cNvPr>
+          <p:cNvGrpSpPr/>
+          <p:nvPr/>
+        </p:nvGrpSpPr>
+        <p:grpSpPr>
+          <a:xfrm>
+            <a:off x="5620624" y="545283"/>
+            <a:ext cx="6392716" cy="5400000"/>
+            <a:chOff x="5620624" y="545283"/>
+            <a:chExt cx="6392716" cy="5400000"/>
+          </a:xfrm>
+        </p:grpSpPr>
+        <p:sp>
+          <p:nvSpPr>
+            <p:cNvPr id="6" name="Rectangle: Rounded Corners 5">
+              <a:extLst>
+                <a:ext uri="{FF2B5EF4-FFF2-40B4-BE49-F238E27FC236}">
+                  <a16:creationId xmlns:a16="http://schemas.microsoft.com/office/drawing/2014/main" id="{C566D844-06F7-44AC-9882-22236257AD6D}"/>
+                </a:ext>
+              </a:extLst>
+            </p:cNvPr>
+            <p:cNvSpPr/>
+            <p:nvPr/>
+          </p:nvSpPr>
+          <p:spPr>
+            <a:xfrm>
+              <a:off x="5620624" y="545283"/>
+              <a:ext cx="5400000" cy="5400000"/>
+            </a:xfrm>
+            <a:prstGeom prst="roundRect">
+              <a:avLst/>
+            </a:prstGeom>
+            <a:solidFill>
+              <a:schemeClr val="tx1"/>
+            </a:solidFill>
+            <a:ln>
+              <a:noFill/>
+            </a:ln>
+          </p:spPr>
+          <p:style>
+            <a:lnRef idx="2">
+              <a:schemeClr val="accent1">
+                <a:shade val="50000"/>
+              </a:schemeClr>
+            </a:lnRef>
+            <a:fillRef idx="1">
+              <a:schemeClr val="accent1"/>
+            </a:fillRef>
+            <a:effectRef idx="0">
+              <a:schemeClr val="accent1"/>
+            </a:effectRef>
+            <a:fontRef idx="minor">
+              <a:schemeClr val="lt1"/>
+            </a:fontRef>
+          </p:style>
+          <p:txBody>
+            <a:bodyPr rtlCol="0" anchor="ctr"/>
+            <a:lstStyle/>
+            <a:p>
+              <a:pPr algn="ctr"/>
+              <a:endParaRPr lang="en-US"/>
+            </a:p>
+          </p:txBody>
+        </p:sp>
+        <p:sp>
+          <p:nvSpPr>
+            <p:cNvPr id="7" name="Oval 6">
+              <a:extLst>
+                <a:ext uri="{FF2B5EF4-FFF2-40B4-BE49-F238E27FC236}">
+                  <a16:creationId xmlns:a16="http://schemas.microsoft.com/office/drawing/2014/main" id="{AA2E1919-0C34-428D-AC5E-3C1F1CC4F7A9}"/>
+                </a:ext>
+              </a:extLst>
+            </p:cNvPr>
+            <p:cNvSpPr/>
+            <p:nvPr/>
+          </p:nvSpPr>
+          <p:spPr>
+            <a:xfrm>
+              <a:off x="6610624" y="1535283"/>
+              <a:ext cx="3420000" cy="3420000"/>
+            </a:xfrm>
+            <a:prstGeom prst="ellipse">
+              <a:avLst/>
+            </a:prstGeom>
+            <a:solidFill>
+              <a:schemeClr val="accent4"/>
+            </a:solidFill>
+            <a:ln>
+              <a:noFill/>
+            </a:ln>
+          </p:spPr>
+          <p:style>
+            <a:lnRef idx="2">
+              <a:schemeClr val="accent1">
+                <a:shade val="50000"/>
+              </a:schemeClr>
+            </a:lnRef>
+            <a:fillRef idx="1">
+              <a:schemeClr val="accent1"/>
+            </a:fillRef>
+            <a:effectRef idx="0">
+              <a:schemeClr val="accent1"/>
+            </a:effectRef>
+            <a:fontRef idx="minor">
+              <a:schemeClr val="lt1"/>
+            </a:fontRef>
+          </p:style>
+          <p:txBody>
+            <a:bodyPr rtlCol="0" anchor="ctr"/>
+            <a:lstStyle/>
+            <a:p>
+              <a:pPr algn="ctr"/>
+              <a:endParaRPr lang="en-US" dirty="0"/>
+            </a:p>
+          </p:txBody>
+        </p:sp>
+        <p:sp>
+          <p:nvSpPr>
+            <p:cNvPr id="8" name="Oval 7">
+              <a:extLst>
+                <a:ext uri="{FF2B5EF4-FFF2-40B4-BE49-F238E27FC236}">
+                  <a16:creationId xmlns:a16="http://schemas.microsoft.com/office/drawing/2014/main" id="{081241E0-95ED-4218-9D49-CD02A5568941}"/>
+                </a:ext>
+              </a:extLst>
+            </p:cNvPr>
+            <p:cNvSpPr/>
+            <p:nvPr/>
+          </p:nvSpPr>
+          <p:spPr>
+            <a:xfrm>
+              <a:off x="7150624" y="2075283"/>
+              <a:ext cx="2340000" cy="2340000"/>
+            </a:xfrm>
+            <a:prstGeom prst="ellipse">
+              <a:avLst/>
+            </a:prstGeom>
+            <a:solidFill>
+              <a:schemeClr val="tx1"/>
+            </a:solidFill>
+            <a:ln>
+              <a:noFill/>
+            </a:ln>
+          </p:spPr>
+          <p:style>
+            <a:lnRef idx="2">
+              <a:schemeClr val="accent1">
+                <a:shade val="50000"/>
+              </a:schemeClr>
+            </a:lnRef>
+            <a:fillRef idx="1">
+              <a:schemeClr val="accent1"/>
+            </a:fillRef>
+            <a:effectRef idx="0">
+              <a:schemeClr val="accent1"/>
+            </a:effectRef>
+            <a:fontRef idx="minor">
+              <a:schemeClr val="lt1"/>
+            </a:fontRef>
+          </p:style>
+          <p:txBody>
+            <a:bodyPr rtlCol="0" anchor="ctr"/>
+            <a:lstStyle/>
+            <a:p>
+              <a:pPr algn="ctr"/>
+              <a:endParaRPr lang="en-US" dirty="0"/>
+            </a:p>
+          </p:txBody>
+        </p:sp>
+        <p:sp>
+          <p:nvSpPr>
+            <p:cNvPr id="10" name="Isosceles Triangle 9">
+              <a:extLst>
+                <a:ext uri="{FF2B5EF4-FFF2-40B4-BE49-F238E27FC236}">
+                  <a16:creationId xmlns:a16="http://schemas.microsoft.com/office/drawing/2014/main" id="{E0E279EC-F203-4D07-8427-B27D7EF7A46E}"/>
+                </a:ext>
+              </a:extLst>
+            </p:cNvPr>
+            <p:cNvSpPr/>
+            <p:nvPr/>
+          </p:nvSpPr>
+          <p:spPr>
+            <a:xfrm rot="8085592">
+              <a:off x="8946246" y="2089950"/>
+              <a:ext cx="3456086" cy="2678103"/>
+            </a:xfrm>
+            <a:prstGeom prst="triangle">
+              <a:avLst>
+                <a:gd name="adj" fmla="val 76713"/>
+              </a:avLst>
+            </a:prstGeom>
+            <a:solidFill>
+              <a:schemeClr val="tx1"/>
+            </a:solidFill>
+            <a:ln>
+              <a:noFill/>
+            </a:ln>
+          </p:spPr>
+          <p:style>
+            <a:lnRef idx="2">
+              <a:schemeClr val="accent1">
+                <a:shade val="50000"/>
+              </a:schemeClr>
+            </a:lnRef>
+            <a:fillRef idx="1">
+              <a:schemeClr val="accent1"/>
+            </a:fillRef>
+            <a:effectRef idx="0">
+              <a:schemeClr val="accent1"/>
+            </a:effectRef>
+            <a:fontRef idx="minor">
+              <a:schemeClr val="lt1"/>
+            </a:fontRef>
+          </p:style>
+          <p:txBody>
+            <a:bodyPr rtlCol="0" anchor="ctr"/>
+            <a:lstStyle/>
+            <a:p>
+              <a:pPr algn="ctr"/>
+              <a:endParaRPr lang="en-US"/>
+            </a:p>
+          </p:txBody>
+        </p:sp>
+        <p:sp>
+          <p:nvSpPr>
+            <p:cNvPr id="12" name="Right Triangle 11">
+              <a:extLst>
+                <a:ext uri="{FF2B5EF4-FFF2-40B4-BE49-F238E27FC236}">
+                  <a16:creationId xmlns:a16="http://schemas.microsoft.com/office/drawing/2014/main" id="{F8908F6A-70B6-40C4-9548-BE3080B4E853}"/>
+                </a:ext>
+              </a:extLst>
+            </p:cNvPr>
+            <p:cNvSpPr/>
+            <p:nvPr/>
+          </p:nvSpPr>
+          <p:spPr>
+            <a:xfrm flipH="1">
+              <a:off x="8689624" y="1668753"/>
+              <a:ext cx="1296000" cy="1296000"/>
+            </a:xfrm>
+            <a:prstGeom prst="rtTriangle">
+              <a:avLst/>
+            </a:prstGeom>
+            <a:solidFill>
+              <a:schemeClr val="accent4"/>
+            </a:solidFill>
+            <a:ln>
+              <a:noFill/>
+            </a:ln>
+          </p:spPr>
+          <p:style>
+            <a:lnRef idx="2">
+              <a:schemeClr val="accent1">
+                <a:shade val="50000"/>
+              </a:schemeClr>
+            </a:lnRef>
+            <a:fillRef idx="1">
+              <a:schemeClr val="accent1"/>
+            </a:fillRef>
+            <a:effectRef idx="0">
+              <a:schemeClr val="accent1"/>
+            </a:effectRef>
+            <a:fontRef idx="minor">
+              <a:schemeClr val="lt1"/>
+            </a:fontRef>
+          </p:style>
+          <p:txBody>
+            <a:bodyPr rtlCol="0" anchor="ctr"/>
+            <a:lstStyle/>
+            <a:p>
+              <a:pPr algn="ctr"/>
+              <a:endParaRPr lang="en-US"/>
+            </a:p>
+          </p:txBody>
+        </p:sp>
+      </p:grpSp>
+    </p:spTree>
+    <p:extLst>
+      <p:ext uri="{BB962C8B-B14F-4D97-AF65-F5344CB8AC3E}">
+        <p14:creationId xmlns:p14="http://schemas.microsoft.com/office/powerpoint/2010/main" val="820732506"/>
+      </p:ext>
+    </p:extLst>
+  </p:cSld>
+  <p:clrMapOvr>
+    <a:masterClrMapping/>
+  </p:clrMapOvr>
+</p:sld>
+</file>
+
+<file path=ppt/slides/slide5.xml><?xml version="1.0" encoding="utf-8"?>
+<p:sld xmlns:a="http://schemas.openxmlformats.org/drawingml/2006/main" xmlns:r="http://schemas.openxmlformats.org/officeDocument/2006/relationships" xmlns:p="http://schemas.openxmlformats.org/presentationml/2006/main">
+  <p:cSld>
+    <p:spTree>
+      <p:nvGrpSpPr>
+        <p:cNvPr id="1" name=""/>
+        <p:cNvGrpSpPr/>
+        <p:nvPr/>
+      </p:nvGrpSpPr>
+      <p:grpSpPr>
+        <a:xfrm>
+          <a:off x="0" y="0"/>
+          <a:ext cx="0" cy="0"/>
+          <a:chOff x="0" y="0"/>
+          <a:chExt cx="0" cy="0"/>
+        </a:xfrm>
+      </p:grpSpPr>
+      <p:grpSp>
+        <p:nvGrpSpPr>
+          <p:cNvPr id="10" name="Group 9">
+            <a:extLst>
+              <a:ext uri="{FF2B5EF4-FFF2-40B4-BE49-F238E27FC236}">
+                <a16:creationId xmlns:a16="http://schemas.microsoft.com/office/drawing/2014/main" id="{A7D0E77B-B46E-4E04-904C-7EF21BF4EC97}"/>
+              </a:ext>
+            </a:extLst>
+          </p:cNvPr>
+          <p:cNvGrpSpPr/>
+          <p:nvPr/>
+        </p:nvGrpSpPr>
+        <p:grpSpPr>
+          <a:xfrm>
+            <a:off x="2676000" y="18000"/>
+            <a:ext cx="6840000" cy="6840000"/>
+            <a:chOff x="3266256" y="-1303508"/>
+            <a:chExt cx="6840000" cy="6840000"/>
+          </a:xfrm>
+        </p:grpSpPr>
+        <p:sp>
+          <p:nvSpPr>
+            <p:cNvPr id="11" name="Rectangle: Rounded Corners 10">
+              <a:extLst>
+                <a:ext uri="{FF2B5EF4-FFF2-40B4-BE49-F238E27FC236}">
+                  <a16:creationId xmlns:a16="http://schemas.microsoft.com/office/drawing/2014/main" id="{62F38D13-325A-4302-9993-ACE7ACCE1FAC}"/>
+                </a:ext>
+              </a:extLst>
+            </p:cNvPr>
+            <p:cNvSpPr/>
+            <p:nvPr/>
+          </p:nvSpPr>
+          <p:spPr>
+            <a:xfrm>
+              <a:off x="3266256" y="-1303508"/>
+              <a:ext cx="6840000" cy="6840000"/>
+            </a:xfrm>
+            <a:prstGeom prst="roundRect">
+              <a:avLst/>
+            </a:prstGeom>
+            <a:solidFill>
+              <a:schemeClr val="tx1"/>
+            </a:solidFill>
+          </p:spPr>
+          <p:style>
+            <a:lnRef idx="2">
+              <a:schemeClr val="accent1">
+                <a:shade val="50000"/>
+              </a:schemeClr>
+            </a:lnRef>
+            <a:fillRef idx="1">
+              <a:schemeClr val="accent1"/>
+            </a:fillRef>
+            <a:effectRef idx="0">
+              <a:schemeClr val="accent1"/>
+            </a:effectRef>
+            <a:fontRef idx="minor">
+              <a:schemeClr val="lt1"/>
+            </a:fontRef>
+          </p:style>
+          <p:txBody>
+            <a:bodyPr rtlCol="0" anchor="ctr"/>
+            <a:lstStyle/>
+            <a:p>
+              <a:pPr algn="ctr"/>
+              <a:endParaRPr lang="en-US"/>
+            </a:p>
+          </p:txBody>
+        </p:sp>
+        <p:grpSp>
+          <p:nvGrpSpPr>
+            <p:cNvPr id="12" name="Group 11">
+              <a:extLst>
+                <a:ext uri="{FF2B5EF4-FFF2-40B4-BE49-F238E27FC236}">
+                  <a16:creationId xmlns:a16="http://schemas.microsoft.com/office/drawing/2014/main" id="{26872A8E-15AC-4007-9EE2-25C13510CB31}"/>
+                </a:ext>
+              </a:extLst>
+            </p:cNvPr>
+            <p:cNvGrpSpPr/>
+            <p:nvPr/>
+          </p:nvGrpSpPr>
+          <p:grpSpPr>
+            <a:xfrm>
+              <a:off x="4706255" y="-191135"/>
+              <a:ext cx="3960001" cy="5165608"/>
+              <a:chOff x="694267" y="170000"/>
+              <a:chExt cx="3960001" cy="5165608"/>
+            </a:xfrm>
+          </p:grpSpPr>
+          <p:sp>
+            <p:nvSpPr>
+              <p:cNvPr id="13" name="Oval 12">
+                <a:extLst>
+                  <a:ext uri="{FF2B5EF4-FFF2-40B4-BE49-F238E27FC236}">
+                    <a16:creationId xmlns:a16="http://schemas.microsoft.com/office/drawing/2014/main" id="{216EADA7-D89D-4D16-B07C-14F0B75AC65C}"/>
+                  </a:ext>
+                </a:extLst>
+              </p:cNvPr>
+              <p:cNvSpPr/>
+              <p:nvPr/>
+            </p:nvSpPr>
+            <p:spPr>
+              <a:xfrm>
+                <a:off x="694267" y="170000"/>
+                <a:ext cx="3600000" cy="3600000"/>
+              </a:xfrm>
+              <a:prstGeom prst="ellipse">
+                <a:avLst/>
+              </a:prstGeom>
+              <a:solidFill>
+                <a:srgbClr val="FFC000"/>
+              </a:solidFill>
+              <a:ln>
+                <a:noFill/>
+              </a:ln>
+            </p:spPr>
+            <p:style>
+              <a:lnRef idx="2">
+                <a:schemeClr val="accent1">
+                  <a:shade val="50000"/>
+                </a:schemeClr>
+              </a:lnRef>
+              <a:fillRef idx="1">
+                <a:schemeClr val="accent1"/>
+              </a:fillRef>
+              <a:effectRef idx="0">
+                <a:schemeClr val="accent1"/>
+              </a:effectRef>
+              <a:fontRef idx="minor">
+                <a:schemeClr val="lt1"/>
+              </a:fontRef>
+            </p:style>
+            <p:txBody>
+              <a:bodyPr rtlCol="0" anchor="ctr"/>
+              <a:lstStyle/>
+              <a:p>
+                <a:pPr algn="ctr"/>
+                <a:endParaRPr lang="en-US"/>
+              </a:p>
+            </p:txBody>
+          </p:sp>
+          <p:sp>
+            <p:nvSpPr>
+              <p:cNvPr id="14" name="Oval 13">
+                <a:extLst>
+                  <a:ext uri="{FF2B5EF4-FFF2-40B4-BE49-F238E27FC236}">
+                    <a16:creationId xmlns:a16="http://schemas.microsoft.com/office/drawing/2014/main" id="{7573381D-3D51-4359-9371-D1973865954B}"/>
+                  </a:ext>
+                </a:extLst>
+              </p:cNvPr>
+              <p:cNvSpPr/>
+              <p:nvPr/>
+            </p:nvSpPr>
+            <p:spPr>
+              <a:xfrm>
+                <a:off x="1414267" y="890000"/>
+                <a:ext cx="2160000" cy="2160000"/>
+              </a:xfrm>
+              <a:prstGeom prst="ellipse">
+                <a:avLst/>
+              </a:prstGeom>
+              <a:solidFill>
+                <a:schemeClr val="tx1"/>
+              </a:solidFill>
+              <a:ln>
+                <a:noFill/>
+              </a:ln>
+            </p:spPr>
+            <p:style>
+              <a:lnRef idx="2">
+                <a:schemeClr val="accent1">
+                  <a:shade val="50000"/>
+                </a:schemeClr>
+              </a:lnRef>
+              <a:fillRef idx="1">
+                <a:schemeClr val="accent1"/>
+              </a:fillRef>
+              <a:effectRef idx="0">
+                <a:schemeClr val="accent1"/>
+              </a:effectRef>
+              <a:fontRef idx="minor">
+                <a:schemeClr val="lt1"/>
+              </a:fontRef>
+            </p:style>
+            <p:txBody>
+              <a:bodyPr rtlCol="0" anchor="ctr"/>
+              <a:lstStyle/>
+              <a:p>
+                <a:pPr algn="ctr"/>
+                <a:endParaRPr lang="en-US"/>
+              </a:p>
+            </p:txBody>
+          </p:sp>
+          <p:sp>
+            <p:nvSpPr>
+              <p:cNvPr id="15" name="Rectangle: Rounded Corners 14">
+                <a:extLst>
+                  <a:ext uri="{FF2B5EF4-FFF2-40B4-BE49-F238E27FC236}">
+                    <a16:creationId xmlns:a16="http://schemas.microsoft.com/office/drawing/2014/main" id="{A145C794-5443-4102-9096-7CF3C7494070}"/>
+                  </a:ext>
+                </a:extLst>
+              </p:cNvPr>
+              <p:cNvSpPr/>
+              <p:nvPr/>
+            </p:nvSpPr>
+            <p:spPr>
+              <a:xfrm rot="2700000">
+                <a:off x="2854268" y="3535608"/>
+                <a:ext cx="2880000" cy="720000"/>
+              </a:xfrm>
+              <a:prstGeom prst="roundRect">
+                <a:avLst>
+                  <a:gd name="adj" fmla="val 31818"/>
+                </a:avLst>
+              </a:prstGeom>
+              <a:solidFill>
+                <a:srgbClr val="FFC000"/>
+              </a:solidFill>
+              <a:ln>
+                <a:noFill/>
+              </a:ln>
+            </p:spPr>
+            <p:style>
+              <a:lnRef idx="2">
+                <a:schemeClr val="accent1">
+                  <a:shade val="50000"/>
+                </a:schemeClr>
+              </a:lnRef>
+              <a:fillRef idx="1">
+                <a:schemeClr val="accent1"/>
+              </a:fillRef>
+              <a:effectRef idx="0">
+                <a:schemeClr val="accent1"/>
+              </a:effectRef>
+              <a:fontRef idx="minor">
+                <a:schemeClr val="lt1"/>
+              </a:fontRef>
+            </p:style>
+            <p:txBody>
+              <a:bodyPr rtlCol="0" anchor="ctr"/>
+              <a:lstStyle/>
+              <a:p>
+                <a:pPr algn="ctr"/>
+                <a:endParaRPr lang="en-US" dirty="0"/>
+              </a:p>
+            </p:txBody>
+          </p:sp>
+        </p:grpSp>
+      </p:grpSp>
+    </p:spTree>
+    <p:extLst>
+      <p:ext uri="{BB962C8B-B14F-4D97-AF65-F5344CB8AC3E}">
+        <p14:creationId xmlns:p14="http://schemas.microsoft.com/office/powerpoint/2010/main" val="1269905481"/>
+      </p:ext>
+    </p:extLst>
+  </p:cSld>
+  <p:clrMapOvr>
+    <a:masterClrMapping/>
+  </p:clrMapOvr>
+</p:sld>
+</file>
+
 <file path=ppt/theme/theme1.xml><?xml version="1.0" encoding="utf-8"?>
 <a:theme xmlns:a="http://schemas.openxmlformats.org/drawingml/2006/main" name="Office Theme">
   <a:themeElements>

</xml_diff>